<commit_message>
Labels pre-existing, minor corrections
</commit_message>
<xml_diff>
--- a/EnergyFile.pptx
+++ b/EnergyFile.pptx
@@ -224,7 +224,7 @@
           <a:p>
             <a:fld id="{E0D357E1-BBCA-7E4B-882A-08C6CB0DA45B}" type="datetimeFigureOut">
               <a:rPr lang="en-US" smtClean="0"/>
-              <a:t>6/1/21</a:t>
+              <a:t>6/2/21</a:t>
             </a:fld>
             <a:endParaRPr lang="en-US"/>
           </a:p>
@@ -1170,13 +1170,7 @@
           <a:p>
             <a:r>
               <a:rPr lang="en-US" dirty="0"/>
-              <a:t>DHAL-2: change to X-DHAL-2 (with adatom)</a:t>
-            </a:r>
-          </a:p>
-          <a:p>
-            <a:r>
-              <a:rPr lang="en-US" dirty="0"/>
-              <a:t>X-DHAL-2: label change to X-SING</a:t>
+              <a:t>RZK: X-DIM-A state -&gt; all three states are dark grey.</a:t>
             </a:r>
           </a:p>
         </p:txBody>
@@ -1263,13 +1257,7 @@
           <a:p>
             <a:r>
               <a:rPr lang="en-US" dirty="0"/>
-              <a:t>DHAL-2: change to X-DHAL-2 (with adatom)</a:t>
-            </a:r>
-          </a:p>
-          <a:p>
-            <a:r>
-              <a:rPr lang="en-US" dirty="0"/>
-              <a:t>X-DHAL-2: label change to X-SING</a:t>
+              <a:t>Do not use</a:t>
             </a:r>
           </a:p>
         </p:txBody>
@@ -2170,7 +2158,7 @@
           <a:p>
             <a:fld id="{2E7BD062-3872-2745-B58F-7FE843EEF26B}" type="datetimeFigureOut">
               <a:rPr lang="en-US" smtClean="0"/>
-              <a:t>6/1/21</a:t>
+              <a:t>6/2/21</a:t>
             </a:fld>
             <a:endParaRPr lang="en-US"/>
           </a:p>
@@ -2368,7 +2356,7 @@
           <a:p>
             <a:fld id="{2E7BD062-3872-2745-B58F-7FE843EEF26B}" type="datetimeFigureOut">
               <a:rPr lang="en-US" smtClean="0"/>
-              <a:t>6/1/21</a:t>
+              <a:t>6/2/21</a:t>
             </a:fld>
             <a:endParaRPr lang="en-US"/>
           </a:p>
@@ -2576,7 +2564,7 @@
           <a:p>
             <a:fld id="{2E7BD062-3872-2745-B58F-7FE843EEF26B}" type="datetimeFigureOut">
               <a:rPr lang="en-US" smtClean="0"/>
-              <a:t>6/1/21</a:t>
+              <a:t>6/2/21</a:t>
             </a:fld>
             <a:endParaRPr lang="en-US"/>
           </a:p>
@@ -2774,7 +2762,7 @@
           <a:p>
             <a:fld id="{2E7BD062-3872-2745-B58F-7FE843EEF26B}" type="datetimeFigureOut">
               <a:rPr lang="en-US" smtClean="0"/>
-              <a:t>6/1/21</a:t>
+              <a:t>6/2/21</a:t>
             </a:fld>
             <a:endParaRPr lang="en-US"/>
           </a:p>
@@ -3049,7 +3037,7 @@
           <a:p>
             <a:fld id="{2E7BD062-3872-2745-B58F-7FE843EEF26B}" type="datetimeFigureOut">
               <a:rPr lang="en-US" smtClean="0"/>
-              <a:t>6/1/21</a:t>
+              <a:t>6/2/21</a:t>
             </a:fld>
             <a:endParaRPr lang="en-US"/>
           </a:p>
@@ -3314,7 +3302,7 @@
           <a:p>
             <a:fld id="{2E7BD062-3872-2745-B58F-7FE843EEF26B}" type="datetimeFigureOut">
               <a:rPr lang="en-US" smtClean="0"/>
-              <a:t>6/1/21</a:t>
+              <a:t>6/2/21</a:t>
             </a:fld>
             <a:endParaRPr lang="en-US"/>
           </a:p>
@@ -3726,7 +3714,7 @@
           <a:p>
             <a:fld id="{2E7BD062-3872-2745-B58F-7FE843EEF26B}" type="datetimeFigureOut">
               <a:rPr lang="en-US" smtClean="0"/>
-              <a:t>6/1/21</a:t>
+              <a:t>6/2/21</a:t>
             </a:fld>
             <a:endParaRPr lang="en-US"/>
           </a:p>
@@ -3867,7 +3855,7 @@
           <a:p>
             <a:fld id="{2E7BD062-3872-2745-B58F-7FE843EEF26B}" type="datetimeFigureOut">
               <a:rPr lang="en-US" smtClean="0"/>
-              <a:t>6/1/21</a:t>
+              <a:t>6/2/21</a:t>
             </a:fld>
             <a:endParaRPr lang="en-US"/>
           </a:p>
@@ -3980,7 +3968,7 @@
           <a:p>
             <a:fld id="{2E7BD062-3872-2745-B58F-7FE843EEF26B}" type="datetimeFigureOut">
               <a:rPr lang="en-US" smtClean="0"/>
-              <a:t>6/1/21</a:t>
+              <a:t>6/2/21</a:t>
             </a:fld>
             <a:endParaRPr lang="en-US"/>
           </a:p>
@@ -4291,7 +4279,7 @@
           <a:p>
             <a:fld id="{2E7BD062-3872-2745-B58F-7FE843EEF26B}" type="datetimeFigureOut">
               <a:rPr lang="en-US" smtClean="0"/>
-              <a:t>6/1/21</a:t>
+              <a:t>6/2/21</a:t>
             </a:fld>
             <a:endParaRPr lang="en-US"/>
           </a:p>
@@ -4579,7 +4567,7 @@
           <a:p>
             <a:fld id="{2E7BD062-3872-2745-B58F-7FE843EEF26B}" type="datetimeFigureOut">
               <a:rPr lang="en-US" smtClean="0"/>
-              <a:t>6/1/21</a:t>
+              <a:t>6/2/21</a:t>
             </a:fld>
             <a:endParaRPr lang="en-US"/>
           </a:p>
@@ -4820,7 +4808,7 @@
           <a:p>
             <a:fld id="{2E7BD062-3872-2745-B58F-7FE843EEF26B}" type="datetimeFigureOut">
               <a:rPr lang="en-US" smtClean="0"/>
-              <a:t>6/1/21</a:t>
+              <a:t>6/2/21</a:t>
             </a:fld>
             <a:endParaRPr lang="en-US"/>
           </a:p>
@@ -14880,8 +14868,8 @@
         </p:blipFill>
         <p:spPr>
           <a:xfrm>
-            <a:off x="3388839" y="1839309"/>
-            <a:ext cx="783770" cy="410899"/>
+            <a:off x="3344014" y="1776775"/>
+            <a:ext cx="783770" cy="410457"/>
           </a:xfrm>
           <a:prstGeom prst="rect">
             <a:avLst/>
@@ -14895,10 +14883,10 @@
       </p:pic>
       <p:pic>
         <p:nvPicPr>
-          <p:cNvPr id="25" name="Picture 24">
-            <a:extLst>
-              <a:ext uri="{FF2B5EF4-FFF2-40B4-BE49-F238E27FC236}">
-                <a16:creationId xmlns:a16="http://schemas.microsoft.com/office/drawing/2014/main" id="{75C58B76-EBE9-5149-9B70-A67A1E763CED}"/>
+          <p:cNvPr id="26" name="Picture 25">
+            <a:extLst>
+              <a:ext uri="{FF2B5EF4-FFF2-40B4-BE49-F238E27FC236}">
+                <a16:creationId xmlns:a16="http://schemas.microsoft.com/office/drawing/2014/main" id="{EC08A79B-F3C1-204D-B02E-4B0B2D277505}"/>
               </a:ext>
             </a:extLst>
           </p:cNvPr>
@@ -14909,26 +14897,30 @@
         </p:nvPicPr>
         <p:blipFill>
           <a:blip r:embed="rId5"/>
-          <a:stretch>
-            <a:fillRect/>
-          </a:stretch>
+          <a:srcRect/>
+          <a:stretch/>
         </p:blipFill>
         <p:spPr>
           <a:xfrm>
-            <a:off x="3959399" y="4036912"/>
-            <a:ext cx="658552" cy="410899"/>
-          </a:xfrm>
-          <a:prstGeom prst="rect">
-            <a:avLst/>
-          </a:prstGeom>
+            <a:off x="4729311" y="2829785"/>
+            <a:ext cx="783769" cy="410457"/>
+          </a:xfrm>
+          <a:prstGeom prst="rect">
+            <a:avLst/>
+          </a:prstGeom>
+          <a:ln w="19050">
+            <a:solidFill>
+              <a:schemeClr val="tx1"/>
+            </a:solidFill>
+          </a:ln>
         </p:spPr>
       </p:pic>
       <p:pic>
         <p:nvPicPr>
-          <p:cNvPr id="26" name="Picture 25">
-            <a:extLst>
-              <a:ext uri="{FF2B5EF4-FFF2-40B4-BE49-F238E27FC236}">
-                <a16:creationId xmlns:a16="http://schemas.microsoft.com/office/drawing/2014/main" id="{EC08A79B-F3C1-204D-B02E-4B0B2D277505}"/>
+          <p:cNvPr id="28" name="Picture 27">
+            <a:extLst>
+              <a:ext uri="{FF2B5EF4-FFF2-40B4-BE49-F238E27FC236}">
+                <a16:creationId xmlns:a16="http://schemas.microsoft.com/office/drawing/2014/main" id="{9E9203AD-8964-F241-BF73-90D689A29A57}"/>
               </a:ext>
             </a:extLst>
           </p:cNvPr>
@@ -14944,8 +14936,8 @@
         </p:blipFill>
         <p:spPr>
           <a:xfrm>
-            <a:off x="4693434" y="4446963"/>
-            <a:ext cx="783769" cy="410899"/>
+            <a:off x="5441360" y="4881255"/>
+            <a:ext cx="759548" cy="398201"/>
           </a:xfrm>
           <a:prstGeom prst="rect">
             <a:avLst/>
@@ -14959,10 +14951,10 @@
       </p:pic>
       <p:pic>
         <p:nvPicPr>
-          <p:cNvPr id="28" name="Picture 27">
-            <a:extLst>
-              <a:ext uri="{FF2B5EF4-FFF2-40B4-BE49-F238E27FC236}">
-                <a16:creationId xmlns:a16="http://schemas.microsoft.com/office/drawing/2014/main" id="{9E9203AD-8964-F241-BF73-90D689A29A57}"/>
+          <p:cNvPr id="38" name="Picture 37">
+            <a:extLst>
+              <a:ext uri="{FF2B5EF4-FFF2-40B4-BE49-F238E27FC236}">
+                <a16:creationId xmlns:a16="http://schemas.microsoft.com/office/drawing/2014/main" id="{7E3C04E7-4351-E54D-8315-633B07261012}"/>
               </a:ext>
             </a:extLst>
           </p:cNvPr>
@@ -14978,8 +14970,8 @@
         </p:blipFill>
         <p:spPr>
           <a:xfrm>
-            <a:off x="5468255" y="4899185"/>
-            <a:ext cx="759548" cy="398201"/>
+            <a:off x="6155255" y="4036911"/>
+            <a:ext cx="783770" cy="410899"/>
           </a:xfrm>
           <a:prstGeom prst="rect">
             <a:avLst/>
@@ -14993,10 +14985,10 @@
       </p:pic>
       <p:pic>
         <p:nvPicPr>
-          <p:cNvPr id="38" name="Picture 37">
-            <a:extLst>
-              <a:ext uri="{FF2B5EF4-FFF2-40B4-BE49-F238E27FC236}">
-                <a16:creationId xmlns:a16="http://schemas.microsoft.com/office/drawing/2014/main" id="{7E3C04E7-4351-E54D-8315-633B07261012}"/>
+          <p:cNvPr id="40" name="Picture 39">
+            <a:extLst>
+              <a:ext uri="{FF2B5EF4-FFF2-40B4-BE49-F238E27FC236}">
+                <a16:creationId xmlns:a16="http://schemas.microsoft.com/office/drawing/2014/main" id="{38D3D3A0-931E-1A43-AD59-792ACF1FCBE4}"/>
               </a:ext>
             </a:extLst>
           </p:cNvPr>
@@ -15012,8 +15004,8 @@
         </p:blipFill>
         <p:spPr>
           <a:xfrm>
-            <a:off x="6155255" y="4036911"/>
-            <a:ext cx="783770" cy="410899"/>
+            <a:off x="6827917" y="4957843"/>
+            <a:ext cx="759548" cy="398201"/>
           </a:xfrm>
           <a:prstGeom prst="rect">
             <a:avLst/>
@@ -15027,10 +15019,10 @@
       </p:pic>
       <p:pic>
         <p:nvPicPr>
-          <p:cNvPr id="40" name="Picture 39">
-            <a:extLst>
-              <a:ext uri="{FF2B5EF4-FFF2-40B4-BE49-F238E27FC236}">
-                <a16:creationId xmlns:a16="http://schemas.microsoft.com/office/drawing/2014/main" id="{38D3D3A0-931E-1A43-AD59-792ACF1FCBE4}"/>
+          <p:cNvPr id="10" name="Picture 9">
+            <a:extLst>
+              <a:ext uri="{FF2B5EF4-FFF2-40B4-BE49-F238E27FC236}">
+                <a16:creationId xmlns:a16="http://schemas.microsoft.com/office/drawing/2014/main" id="{7BFF8056-C421-D44A-A766-5C9B076E46D5}"/>
               </a:ext>
             </a:extLst>
           </p:cNvPr>
@@ -15046,8 +15038,8 @@
         </p:blipFill>
         <p:spPr>
           <a:xfrm>
-            <a:off x="6827917" y="4957843"/>
-            <a:ext cx="759548" cy="398201"/>
+            <a:off x="4051243" y="3992306"/>
+            <a:ext cx="783768" cy="410457"/>
           </a:xfrm>
           <a:prstGeom prst="rect">
             <a:avLst/>

</xml_diff>

<commit_message>
Labels to mark TS with color background
</commit_message>
<xml_diff>
--- a/EnergyFile.pptx
+++ b/EnergyFile.pptx
@@ -223,7 +223,7 @@
           <a:p>
             <a:fld id="{E0D357E1-BBCA-7E4B-882A-08C6CB0DA45B}" type="datetimeFigureOut">
               <a:rPr lang="en-US" smtClean="0"/>
-              <a:t>9/3/21</a:t>
+              <a:t>10/18/21</a:t>
             </a:fld>
             <a:endParaRPr lang="en-US"/>
           </a:p>
@@ -618,6 +618,93 @@
           <a:bodyPr/>
           <a:lstStyle/>
           <a:p>
+            <a:endParaRPr lang="en-US" dirty="0">
+              <a:latin typeface="Arial" panose="020B0604020202020204" pitchFamily="34" charset="0"/>
+              <a:cs typeface="Arial" panose="020B0604020202020204" pitchFamily="34" charset="0"/>
+            </a:endParaRPr>
+          </a:p>
+        </p:txBody>
+      </p:sp>
+      <p:sp>
+        <p:nvSpPr>
+          <p:cNvPr id="4" name="Slide Number Placeholder 3"/>
+          <p:cNvSpPr>
+            <a:spLocks noGrp="1"/>
+          </p:cNvSpPr>
+          <p:nvPr>
+            <p:ph type="sldNum" sz="quarter" idx="5"/>
+          </p:nvPr>
+        </p:nvSpPr>
+        <p:spPr/>
+        <p:txBody>
+          <a:bodyPr/>
+          <a:lstStyle/>
+          <a:p>
+            <a:fld id="{4E02406E-51B6-6C4F-B6FA-25E5FA24AA93}" type="slidenum">
+              <a:rPr lang="en-US" smtClean="0"/>
+              <a:t>12</a:t>
+            </a:fld>
+            <a:endParaRPr lang="en-US"/>
+          </a:p>
+        </p:txBody>
+      </p:sp>
+    </p:spTree>
+    <p:extLst>
+      <p:ext uri="{BB962C8B-B14F-4D97-AF65-F5344CB8AC3E}">
+        <p14:creationId xmlns:p14="http://schemas.microsoft.com/office/powerpoint/2010/main" val="2350327741"/>
+      </p:ext>
+    </p:extLst>
+  </p:cSld>
+  <p:clrMapOvr>
+    <a:masterClrMapping/>
+  </p:clrMapOvr>
+</p:notes>
+</file>
+
+<file path=ppt/notesSlides/notesSlide11.xml><?xml version="1.0" encoding="utf-8"?>
+<p:notes xmlns:a="http://schemas.openxmlformats.org/drawingml/2006/main" xmlns:r="http://schemas.openxmlformats.org/officeDocument/2006/relationships" xmlns:p="http://schemas.openxmlformats.org/presentationml/2006/main">
+  <p:cSld>
+    <p:spTree>
+      <p:nvGrpSpPr>
+        <p:cNvPr id="1" name=""/>
+        <p:cNvGrpSpPr/>
+        <p:nvPr/>
+      </p:nvGrpSpPr>
+      <p:grpSpPr>
+        <a:xfrm>
+          <a:off x="0" y="0"/>
+          <a:ext cx="0" cy="0"/>
+          <a:chOff x="0" y="0"/>
+          <a:chExt cx="0" cy="0"/>
+        </a:xfrm>
+      </p:grpSpPr>
+      <p:sp>
+        <p:nvSpPr>
+          <p:cNvPr id="2" name="Slide Image Placeholder 1"/>
+          <p:cNvSpPr>
+            <a:spLocks noGrp="1" noRot="1" noChangeAspect="1"/>
+          </p:cNvSpPr>
+          <p:nvPr>
+            <p:ph type="sldImg"/>
+          </p:nvPr>
+        </p:nvSpPr>
+        <p:spPr/>
+      </p:sp>
+      <p:sp>
+        <p:nvSpPr>
+          <p:cNvPr id="3" name="Notes Placeholder 2"/>
+          <p:cNvSpPr>
+            <a:spLocks noGrp="1"/>
+          </p:cNvSpPr>
+          <p:nvPr>
+            <p:ph type="body" idx="1"/>
+          </p:nvPr>
+        </p:nvSpPr>
+        <p:spPr/>
+        <p:txBody>
+          <a:bodyPr/>
+          <a:lstStyle/>
+          <a:p>
             <a:r>
               <a:rPr lang="en-US" dirty="0"/>
               <a:t>The last state now is the pure surface + dimer in gas + two bromine atom in gas (0.07eV, not 0.00 eV anu more)</a:t>
@@ -670,7 +757,7 @@
 </p:notes>
 </file>
 
-<file path=ppt/notesSlides/notesSlide11.xml><?xml version="1.0" encoding="utf-8"?>
+<file path=ppt/notesSlides/notesSlide12.xml><?xml version="1.0" encoding="utf-8"?>
 <p:notes xmlns:a="http://schemas.openxmlformats.org/drawingml/2006/main" xmlns:r="http://schemas.openxmlformats.org/officeDocument/2006/relationships" xmlns:p="http://schemas.openxmlformats.org/presentationml/2006/main">
   <p:cSld>
     <p:spTree>
@@ -1029,6 +1116,90 @@
           <a:bodyPr/>
           <a:lstStyle/>
           <a:p>
+            <a:endParaRPr lang="en-US" dirty="0"/>
+          </a:p>
+        </p:txBody>
+      </p:sp>
+      <p:sp>
+        <p:nvSpPr>
+          <p:cNvPr id="4" name="Slide Number Placeholder 3"/>
+          <p:cNvSpPr>
+            <a:spLocks noGrp="1"/>
+          </p:cNvSpPr>
+          <p:nvPr>
+            <p:ph type="sldNum" sz="quarter" idx="5"/>
+          </p:nvPr>
+        </p:nvSpPr>
+        <p:spPr/>
+        <p:txBody>
+          <a:bodyPr/>
+          <a:lstStyle/>
+          <a:p>
+            <a:fld id="{4E02406E-51B6-6C4F-B6FA-25E5FA24AA93}" type="slidenum">
+              <a:rPr lang="en-US" smtClean="0"/>
+              <a:t>6</a:t>
+            </a:fld>
+            <a:endParaRPr lang="en-US"/>
+          </a:p>
+        </p:txBody>
+      </p:sp>
+    </p:spTree>
+    <p:extLst>
+      <p:ext uri="{BB962C8B-B14F-4D97-AF65-F5344CB8AC3E}">
+        <p14:creationId xmlns:p14="http://schemas.microsoft.com/office/powerpoint/2010/main" val="299461465"/>
+      </p:ext>
+    </p:extLst>
+  </p:cSld>
+  <p:clrMapOvr>
+    <a:masterClrMapping/>
+  </p:clrMapOvr>
+</p:notes>
+</file>
+
+<file path=ppt/notesSlides/notesSlide5.xml><?xml version="1.0" encoding="utf-8"?>
+<p:notes xmlns:a="http://schemas.openxmlformats.org/drawingml/2006/main" xmlns:r="http://schemas.openxmlformats.org/officeDocument/2006/relationships" xmlns:p="http://schemas.openxmlformats.org/presentationml/2006/main">
+  <p:cSld>
+    <p:spTree>
+      <p:nvGrpSpPr>
+        <p:cNvPr id="1" name=""/>
+        <p:cNvGrpSpPr/>
+        <p:nvPr/>
+      </p:nvGrpSpPr>
+      <p:grpSpPr>
+        <a:xfrm>
+          <a:off x="0" y="0"/>
+          <a:ext cx="0" cy="0"/>
+          <a:chOff x="0" y="0"/>
+          <a:chExt cx="0" cy="0"/>
+        </a:xfrm>
+      </p:grpSpPr>
+      <p:sp>
+        <p:nvSpPr>
+          <p:cNvPr id="2" name="Slide Image Placeholder 1"/>
+          <p:cNvSpPr>
+            <a:spLocks noGrp="1" noRot="1" noChangeAspect="1"/>
+          </p:cNvSpPr>
+          <p:nvPr>
+            <p:ph type="sldImg"/>
+          </p:nvPr>
+        </p:nvSpPr>
+        <p:spPr/>
+      </p:sp>
+      <p:sp>
+        <p:nvSpPr>
+          <p:cNvPr id="3" name="Notes Placeholder 2"/>
+          <p:cNvSpPr>
+            <a:spLocks noGrp="1"/>
+          </p:cNvSpPr>
+          <p:nvPr>
+            <p:ph type="body" idx="1"/>
+          </p:nvPr>
+        </p:nvSpPr>
+        <p:spPr/>
+        <p:txBody>
+          <a:bodyPr/>
+          <a:lstStyle/>
+          <a:p>
             <a:pPr marL="228600" marR="0" lvl="0" indent="-228600" algn="l" defTabSz="914400" rtl="0" eaLnBrk="1" fontAlgn="auto" latinLnBrk="0" hangingPunct="1">
               <a:lnSpc>
                 <a:spcPct val="100000"/>
@@ -1316,7 +1487,7 @@
 </p:notes>
 </file>
 
-<file path=ppt/notesSlides/notesSlide5.xml><?xml version="1.0" encoding="utf-8"?>
+<file path=ppt/notesSlides/notesSlide6.xml><?xml version="1.0" encoding="utf-8"?>
 <p:notes xmlns:a="http://schemas.openxmlformats.org/drawingml/2006/main" xmlns:r="http://schemas.openxmlformats.org/officeDocument/2006/relationships" xmlns:p="http://schemas.openxmlformats.org/presentationml/2006/main">
   <p:cSld>
     <p:spTree>
@@ -1400,7 +1571,7 @@
 </p:notes>
 </file>
 
-<file path=ppt/notesSlides/notesSlide6.xml><?xml version="1.0" encoding="utf-8"?>
+<file path=ppt/notesSlides/notesSlide7.xml><?xml version="1.0" encoding="utf-8"?>
 <p:notes xmlns:a="http://schemas.openxmlformats.org/drawingml/2006/main" xmlns:r="http://schemas.openxmlformats.org/officeDocument/2006/relationships" xmlns:p="http://schemas.openxmlformats.org/presentationml/2006/main">
   <p:cSld>
     <p:spTree>
@@ -1484,7 +1655,7 @@
 </p:notes>
 </file>
 
-<file path=ppt/notesSlides/notesSlide7.xml><?xml version="1.0" encoding="utf-8"?>
+<file path=ppt/notesSlides/notesSlide8.xml><?xml version="1.0" encoding="utf-8"?>
 <p:notes xmlns:a="http://schemas.openxmlformats.org/drawingml/2006/main" xmlns:r="http://schemas.openxmlformats.org/officeDocument/2006/relationships" xmlns:p="http://schemas.openxmlformats.org/presentationml/2006/main">
   <p:cSld>
     <p:spTree>
@@ -1586,7 +1757,7 @@
 </p:notes>
 </file>
 
-<file path=ppt/notesSlides/notesSlide8.xml><?xml version="1.0" encoding="utf-8"?>
+<file path=ppt/notesSlides/notesSlide9.xml><?xml version="1.0" encoding="utf-8"?>
 <p:notes xmlns:a="http://schemas.openxmlformats.org/drawingml/2006/main" xmlns:r="http://schemas.openxmlformats.org/officeDocument/2006/relationships" xmlns:p="http://schemas.openxmlformats.org/presentationml/2006/main">
   <p:cSld>
     <p:spTree>
@@ -1688,93 +1859,6 @@
 </p:notes>
 </file>
 
-<file path=ppt/notesSlides/notesSlide9.xml><?xml version="1.0" encoding="utf-8"?>
-<p:notes xmlns:a="http://schemas.openxmlformats.org/drawingml/2006/main" xmlns:r="http://schemas.openxmlformats.org/officeDocument/2006/relationships" xmlns:p="http://schemas.openxmlformats.org/presentationml/2006/main">
-  <p:cSld>
-    <p:spTree>
-      <p:nvGrpSpPr>
-        <p:cNvPr id="1" name=""/>
-        <p:cNvGrpSpPr/>
-        <p:nvPr/>
-      </p:nvGrpSpPr>
-      <p:grpSpPr>
-        <a:xfrm>
-          <a:off x="0" y="0"/>
-          <a:ext cx="0" cy="0"/>
-          <a:chOff x="0" y="0"/>
-          <a:chExt cx="0" cy="0"/>
-        </a:xfrm>
-      </p:grpSpPr>
-      <p:sp>
-        <p:nvSpPr>
-          <p:cNvPr id="2" name="Slide Image Placeholder 1"/>
-          <p:cNvSpPr>
-            <a:spLocks noGrp="1" noRot="1" noChangeAspect="1"/>
-          </p:cNvSpPr>
-          <p:nvPr>
-            <p:ph type="sldImg"/>
-          </p:nvPr>
-        </p:nvSpPr>
-        <p:spPr/>
-      </p:sp>
-      <p:sp>
-        <p:nvSpPr>
-          <p:cNvPr id="3" name="Notes Placeholder 2"/>
-          <p:cNvSpPr>
-            <a:spLocks noGrp="1"/>
-          </p:cNvSpPr>
-          <p:nvPr>
-            <p:ph type="body" idx="1"/>
-          </p:nvPr>
-        </p:nvSpPr>
-        <p:spPr/>
-        <p:txBody>
-          <a:bodyPr/>
-          <a:lstStyle/>
-          <a:p>
-            <a:endParaRPr lang="en-US" dirty="0">
-              <a:latin typeface="Arial" panose="020B0604020202020204" pitchFamily="34" charset="0"/>
-              <a:cs typeface="Arial" panose="020B0604020202020204" pitchFamily="34" charset="0"/>
-            </a:endParaRPr>
-          </a:p>
-        </p:txBody>
-      </p:sp>
-      <p:sp>
-        <p:nvSpPr>
-          <p:cNvPr id="4" name="Slide Number Placeholder 3"/>
-          <p:cNvSpPr>
-            <a:spLocks noGrp="1"/>
-          </p:cNvSpPr>
-          <p:nvPr>
-            <p:ph type="sldNum" sz="quarter" idx="5"/>
-          </p:nvPr>
-        </p:nvSpPr>
-        <p:spPr/>
-        <p:txBody>
-          <a:bodyPr/>
-          <a:lstStyle/>
-          <a:p>
-            <a:fld id="{4E02406E-51B6-6C4F-B6FA-25E5FA24AA93}" type="slidenum">
-              <a:rPr lang="en-US" smtClean="0"/>
-              <a:t>12</a:t>
-            </a:fld>
-            <a:endParaRPr lang="en-US"/>
-          </a:p>
-        </p:txBody>
-      </p:sp>
-    </p:spTree>
-    <p:extLst>
-      <p:ext uri="{BB962C8B-B14F-4D97-AF65-F5344CB8AC3E}">
-        <p14:creationId xmlns:p14="http://schemas.microsoft.com/office/powerpoint/2010/main" val="2350327741"/>
-      </p:ext>
-    </p:extLst>
-  </p:cSld>
-  <p:clrMapOvr>
-    <a:masterClrMapping/>
-  </p:clrMapOvr>
-</p:notes>
-</file>
-
 <file path=ppt/slideLayouts/slideLayout1.xml><?xml version="1.0" encoding="utf-8"?>
 <p:sldLayout xmlns:a="http://schemas.openxmlformats.org/drawingml/2006/main" xmlns:r="http://schemas.openxmlformats.org/officeDocument/2006/relationships" xmlns:p="http://schemas.openxmlformats.org/presentationml/2006/main" type="title" preserve="1">
   <p:cSld name="Title Slide">
@@ -1922,7 +2006,7 @@
           <a:p>
             <a:fld id="{2E7BD062-3872-2745-B58F-7FE843EEF26B}" type="datetimeFigureOut">
               <a:rPr lang="en-US" smtClean="0"/>
-              <a:t>9/3/21</a:t>
+              <a:t>10/18/21</a:t>
             </a:fld>
             <a:endParaRPr lang="en-US"/>
           </a:p>
@@ -2120,7 +2204,7 @@
           <a:p>
             <a:fld id="{2E7BD062-3872-2745-B58F-7FE843EEF26B}" type="datetimeFigureOut">
               <a:rPr lang="en-US" smtClean="0"/>
-              <a:t>9/3/21</a:t>
+              <a:t>10/18/21</a:t>
             </a:fld>
             <a:endParaRPr lang="en-US"/>
           </a:p>
@@ -2328,7 +2412,7 @@
           <a:p>
             <a:fld id="{2E7BD062-3872-2745-B58F-7FE843EEF26B}" type="datetimeFigureOut">
               <a:rPr lang="en-US" smtClean="0"/>
-              <a:t>9/3/21</a:t>
+              <a:t>10/18/21</a:t>
             </a:fld>
             <a:endParaRPr lang="en-US"/>
           </a:p>
@@ -2526,7 +2610,7 @@
           <a:p>
             <a:fld id="{2E7BD062-3872-2745-B58F-7FE843EEF26B}" type="datetimeFigureOut">
               <a:rPr lang="en-US" smtClean="0"/>
-              <a:t>9/3/21</a:t>
+              <a:t>10/18/21</a:t>
             </a:fld>
             <a:endParaRPr lang="en-US"/>
           </a:p>
@@ -2801,7 +2885,7 @@
           <a:p>
             <a:fld id="{2E7BD062-3872-2745-B58F-7FE843EEF26B}" type="datetimeFigureOut">
               <a:rPr lang="en-US" smtClean="0"/>
-              <a:t>9/3/21</a:t>
+              <a:t>10/18/21</a:t>
             </a:fld>
             <a:endParaRPr lang="en-US"/>
           </a:p>
@@ -3066,7 +3150,7 @@
           <a:p>
             <a:fld id="{2E7BD062-3872-2745-B58F-7FE843EEF26B}" type="datetimeFigureOut">
               <a:rPr lang="en-US" smtClean="0"/>
-              <a:t>9/3/21</a:t>
+              <a:t>10/18/21</a:t>
             </a:fld>
             <a:endParaRPr lang="en-US"/>
           </a:p>
@@ -3478,7 +3562,7 @@
           <a:p>
             <a:fld id="{2E7BD062-3872-2745-B58F-7FE843EEF26B}" type="datetimeFigureOut">
               <a:rPr lang="en-US" smtClean="0"/>
-              <a:t>9/3/21</a:t>
+              <a:t>10/18/21</a:t>
             </a:fld>
             <a:endParaRPr lang="en-US"/>
           </a:p>
@@ -3619,7 +3703,7 @@
           <a:p>
             <a:fld id="{2E7BD062-3872-2745-B58F-7FE843EEF26B}" type="datetimeFigureOut">
               <a:rPr lang="en-US" smtClean="0"/>
-              <a:t>9/3/21</a:t>
+              <a:t>10/18/21</a:t>
             </a:fld>
             <a:endParaRPr lang="en-US"/>
           </a:p>
@@ -3732,7 +3816,7 @@
           <a:p>
             <a:fld id="{2E7BD062-3872-2745-B58F-7FE843EEF26B}" type="datetimeFigureOut">
               <a:rPr lang="en-US" smtClean="0"/>
-              <a:t>9/3/21</a:t>
+              <a:t>10/18/21</a:t>
             </a:fld>
             <a:endParaRPr lang="en-US"/>
           </a:p>
@@ -4043,7 +4127,7 @@
           <a:p>
             <a:fld id="{2E7BD062-3872-2745-B58F-7FE843EEF26B}" type="datetimeFigureOut">
               <a:rPr lang="en-US" smtClean="0"/>
-              <a:t>9/3/21</a:t>
+              <a:t>10/18/21</a:t>
             </a:fld>
             <a:endParaRPr lang="en-US"/>
           </a:p>
@@ -4331,7 +4415,7 @@
           <a:p>
             <a:fld id="{2E7BD062-3872-2745-B58F-7FE843EEF26B}" type="datetimeFigureOut">
               <a:rPr lang="en-US" smtClean="0"/>
-              <a:t>9/3/21</a:t>
+              <a:t>10/18/21</a:t>
             </a:fld>
             <a:endParaRPr lang="en-US"/>
           </a:p>
@@ -4572,7 +4656,7 @@
           <a:p>
             <a:fld id="{2E7BD062-3872-2745-B58F-7FE843EEF26B}" type="datetimeFigureOut">
               <a:rPr lang="en-US" smtClean="0"/>
-              <a:t>9/3/21</a:t>
+              <a:t>10/18/21</a:t>
             </a:fld>
             <a:endParaRPr lang="en-US"/>
           </a:p>
@@ -5817,8 +5901,8 @@
           </p:blipFill>
           <p:spPr>
             <a:xfrm>
-              <a:off x="2596670" y="3370615"/>
-              <a:ext cx="721360" cy="450087"/>
+              <a:off x="2596670" y="3371123"/>
+              <a:ext cx="721360" cy="449071"/>
             </a:xfrm>
             <a:prstGeom prst="rect">
               <a:avLst/>
@@ -5953,8 +6037,8 @@
           </p:blipFill>
           <p:spPr>
             <a:xfrm>
-              <a:off x="5431878" y="4184944"/>
-              <a:ext cx="721360" cy="450087"/>
+              <a:off x="5374998" y="4299753"/>
+              <a:ext cx="721360" cy="449071"/>
             </a:xfrm>
             <a:prstGeom prst="rect">
               <a:avLst/>
@@ -5987,7 +6071,7 @@
           </p:blipFill>
           <p:spPr>
             <a:xfrm>
-              <a:off x="6164916" y="3279649"/>
+              <a:off x="6164916" y="3300431"/>
               <a:ext cx="721360" cy="450087"/>
             </a:xfrm>
             <a:prstGeom prst="rect">
@@ -6021,8 +6105,8 @@
           </p:blipFill>
           <p:spPr>
             <a:xfrm>
-              <a:off x="6844544" y="2389235"/>
-              <a:ext cx="721360" cy="450087"/>
+              <a:off x="6844544" y="2389743"/>
+              <a:ext cx="721360" cy="449071"/>
             </a:xfrm>
             <a:prstGeom prst="rect">
               <a:avLst/>
@@ -6157,8 +6241,8 @@
           </p:blipFill>
           <p:spPr>
             <a:xfrm>
-              <a:off x="6091010" y="1084779"/>
-              <a:ext cx="721360" cy="450087"/>
+              <a:off x="6122183" y="1199588"/>
+              <a:ext cx="721360" cy="449071"/>
             </a:xfrm>
             <a:prstGeom prst="rect">
               <a:avLst/>
@@ -6225,8 +6309,8 @@
           </p:blipFill>
           <p:spPr>
             <a:xfrm>
-              <a:off x="5364607" y="2995671"/>
-              <a:ext cx="721360" cy="450087"/>
+              <a:off x="5374998" y="2975397"/>
+              <a:ext cx="721360" cy="449071"/>
             </a:xfrm>
             <a:prstGeom prst="rect">
               <a:avLst/>
@@ -7344,8 +7428,8 @@
           </p:blipFill>
           <p:spPr>
             <a:xfrm>
-              <a:off x="2994697" y="3064658"/>
-              <a:ext cx="721360" cy="450087"/>
+              <a:off x="2966121" y="3079454"/>
+              <a:ext cx="721360" cy="449071"/>
             </a:xfrm>
             <a:prstGeom prst="rect">
               <a:avLst/>
@@ -7446,7 +7530,7 @@
           </p:blipFill>
           <p:spPr>
             <a:xfrm>
-              <a:off x="5096452" y="4784318"/>
+              <a:off x="5096452" y="4670017"/>
               <a:ext cx="721360" cy="450087"/>
             </a:xfrm>
             <a:prstGeom prst="rect">
@@ -7480,8 +7564,8 @@
           </p:blipFill>
           <p:spPr>
             <a:xfrm>
-              <a:off x="5649328" y="2347879"/>
-              <a:ext cx="721360" cy="450087"/>
+              <a:off x="5649328" y="2348387"/>
+              <a:ext cx="721360" cy="449071"/>
             </a:xfrm>
             <a:prstGeom prst="rect">
               <a:avLst/>
@@ -7548,8 +7632,8 @@
           </p:blipFill>
           <p:spPr>
             <a:xfrm>
-              <a:off x="7205607" y="2183322"/>
-              <a:ext cx="721360" cy="450087"/>
+              <a:off x="7205607" y="2183830"/>
+              <a:ext cx="721360" cy="449071"/>
             </a:xfrm>
             <a:prstGeom prst="rect">
               <a:avLst/>
@@ -7582,7 +7666,7 @@
           </p:blipFill>
           <p:spPr>
             <a:xfrm>
-              <a:off x="7787230" y="3514745"/>
+              <a:off x="7872958" y="3514745"/>
               <a:ext cx="721360" cy="450087"/>
             </a:xfrm>
             <a:prstGeom prst="rect">
@@ -7616,7 +7700,7 @@
           </p:blipFill>
           <p:spPr>
             <a:xfrm>
-              <a:off x="8550226" y="3064658"/>
+              <a:off x="8564514" y="2964642"/>
               <a:ext cx="721360" cy="450087"/>
             </a:xfrm>
             <a:prstGeom prst="rect">
@@ -7650,7 +7734,7 @@
           </p:blipFill>
           <p:spPr>
             <a:xfrm>
-              <a:off x="9278017" y="2434865"/>
+              <a:off x="9249441" y="2434865"/>
               <a:ext cx="721360" cy="450087"/>
             </a:xfrm>
             <a:prstGeom prst="rect">
@@ -7684,8 +7768,8 @@
           </p:blipFill>
           <p:spPr>
             <a:xfrm>
-              <a:off x="6492173" y="1138784"/>
-              <a:ext cx="721360" cy="450087"/>
+              <a:off x="6492173" y="1139292"/>
+              <a:ext cx="721360" cy="449071"/>
             </a:xfrm>
             <a:prstGeom prst="rect">
               <a:avLst/>
@@ -7718,7 +7802,7 @@
           </p:blipFill>
           <p:spPr>
             <a:xfrm>
-              <a:off x="9166159" y="1372303"/>
+              <a:off x="9249441" y="1372303"/>
               <a:ext cx="721360" cy="450087"/>
             </a:xfrm>
             <a:prstGeom prst="rect">
@@ -7752,8 +7836,8 @@
           </p:blipFill>
           <p:spPr>
             <a:xfrm>
-              <a:off x="5735320" y="4240286"/>
-              <a:ext cx="721360" cy="450087"/>
+              <a:off x="5749608" y="3997901"/>
+              <a:ext cx="721360" cy="449071"/>
             </a:xfrm>
             <a:prstGeom prst="rect">
               <a:avLst/>
@@ -7786,7 +7870,7 @@
           </p:blipFill>
           <p:spPr>
             <a:xfrm>
-              <a:off x="8556657" y="5543143"/>
+              <a:off x="8570945" y="5557431"/>
               <a:ext cx="721360" cy="450087"/>
             </a:xfrm>
             <a:prstGeom prst="rect">
@@ -7854,7 +7938,7 @@
           </p:blipFill>
           <p:spPr>
             <a:xfrm>
-              <a:off x="9979229" y="1276144"/>
+              <a:off x="10036381" y="1276144"/>
               <a:ext cx="721360" cy="450087"/>
             </a:xfrm>
             <a:prstGeom prst="rect">
@@ -7888,7 +7972,7 @@
           </p:blipFill>
           <p:spPr>
             <a:xfrm>
-              <a:off x="9979229" y="3365026"/>
+              <a:off x="10036381" y="3365026"/>
               <a:ext cx="721360" cy="450087"/>
             </a:xfrm>
             <a:prstGeom prst="rect">
@@ -10916,18 +11000,22 @@
           </p:nvPicPr>
           <p:blipFill>
             <a:blip r:embed="rId6"/>
-            <a:stretch>
-              <a:fillRect/>
-            </a:stretch>
+            <a:srcRect/>
+            <a:stretch/>
           </p:blipFill>
           <p:spPr>
             <a:xfrm>
-              <a:off x="2890984" y="2725556"/>
-              <a:ext cx="1005120" cy="627137"/>
+              <a:off x="2890984" y="2726263"/>
+              <a:ext cx="1005120" cy="625722"/>
             </a:xfrm>
             <a:prstGeom prst="rect">
               <a:avLst/>
             </a:prstGeom>
+            <a:ln>
+              <a:solidFill>
+                <a:schemeClr val="tx1"/>
+              </a:solidFill>
+            </a:ln>
           </p:spPr>
         </p:pic>
         <p:pic>
@@ -11992,7 +12080,7 @@
             <p:nvPr/>
           </p:nvPicPr>
           <p:blipFill rotWithShape="1">
-            <a:blip r:embed="rId2"/>
+            <a:blip r:embed="rId3"/>
             <a:srcRect t="16497" b="15932"/>
             <a:stretch/>
           </p:blipFill>
@@ -12525,14 +12613,14 @@
           <p:nvPr/>
         </p:nvPicPr>
         <p:blipFill>
-          <a:blip r:embed="rId3"/>
+          <a:blip r:embed="rId4"/>
           <a:stretch>
             <a:fillRect/>
           </a:stretch>
         </p:blipFill>
         <p:spPr>
           <a:xfrm>
-            <a:off x="2461387" y="1078985"/>
+            <a:off x="2466894" y="3584317"/>
             <a:ext cx="1267968" cy="693420"/>
           </a:xfrm>
           <a:prstGeom prst="rect">
@@ -12546,36 +12634,6 @@
             <a:extLst>
               <a:ext uri="{FF2B5EF4-FFF2-40B4-BE49-F238E27FC236}">
                 <a16:creationId xmlns:a16="http://schemas.microsoft.com/office/drawing/2014/main" id="{481564C8-9D55-CB43-80C4-BCF3B1687798}"/>
-              </a:ext>
-            </a:extLst>
-          </p:cNvPr>
-          <p:cNvPicPr>
-            <a:picLocks noChangeAspect="1"/>
-          </p:cNvPicPr>
-          <p:nvPr/>
-        </p:nvPicPr>
-        <p:blipFill>
-          <a:blip r:embed="rId4"/>
-          <a:stretch>
-            <a:fillRect/>
-          </a:stretch>
-        </p:blipFill>
-        <p:spPr>
-          <a:xfrm>
-            <a:off x="3684414" y="4289514"/>
-            <a:ext cx="1267968" cy="693420"/>
-          </a:xfrm>
-          <a:prstGeom prst="rect">
-            <a:avLst/>
-          </a:prstGeom>
-        </p:spPr>
-      </p:pic>
-      <p:pic>
-        <p:nvPicPr>
-          <p:cNvPr id="20" name="Picture 19">
-            <a:extLst>
-              <a:ext uri="{FF2B5EF4-FFF2-40B4-BE49-F238E27FC236}">
-                <a16:creationId xmlns:a16="http://schemas.microsoft.com/office/drawing/2014/main" id="{75AA4657-8A57-0941-8856-DE1467A2C7F5}"/>
               </a:ext>
             </a:extLst>
           </p:cNvPr>
@@ -12592,7 +12650,7 @@
         </p:blipFill>
         <p:spPr>
           <a:xfrm>
-            <a:off x="4908237" y="1829506"/>
+            <a:off x="3688819" y="4289514"/>
             <a:ext cx="1267968" cy="693420"/>
           </a:xfrm>
           <a:prstGeom prst="rect">
@@ -12602,10 +12660,10 @@
       </p:pic>
       <p:pic>
         <p:nvPicPr>
-          <p:cNvPr id="22" name="Picture 21">
-            <a:extLst>
-              <a:ext uri="{FF2B5EF4-FFF2-40B4-BE49-F238E27FC236}">
-                <a16:creationId xmlns:a16="http://schemas.microsoft.com/office/drawing/2014/main" id="{A1C323F6-4B85-E04C-A91F-372DE0B1AFFE}"/>
+          <p:cNvPr id="20" name="Picture 19">
+            <a:extLst>
+              <a:ext uri="{FF2B5EF4-FFF2-40B4-BE49-F238E27FC236}">
+                <a16:creationId xmlns:a16="http://schemas.microsoft.com/office/drawing/2014/main" id="{75AA4657-8A57-0941-8856-DE1467A2C7F5}"/>
               </a:ext>
             </a:extLst>
           </p:cNvPr>
@@ -12622,7 +12680,7 @@
         </p:blipFill>
         <p:spPr>
           <a:xfrm>
-            <a:off x="6130468" y="4995208"/>
+            <a:off x="4910744" y="4763607"/>
             <a:ext cx="1267968" cy="693420"/>
           </a:xfrm>
           <a:prstGeom prst="rect">
@@ -12632,10 +12690,10 @@
       </p:pic>
       <p:pic>
         <p:nvPicPr>
-          <p:cNvPr id="24" name="Picture 23">
-            <a:extLst>
-              <a:ext uri="{FF2B5EF4-FFF2-40B4-BE49-F238E27FC236}">
-                <a16:creationId xmlns:a16="http://schemas.microsoft.com/office/drawing/2014/main" id="{4381691B-16F0-7D47-B670-77FF91CA1532}"/>
+          <p:cNvPr id="22" name="Picture 21">
+            <a:extLst>
+              <a:ext uri="{FF2B5EF4-FFF2-40B4-BE49-F238E27FC236}">
+                <a16:creationId xmlns:a16="http://schemas.microsoft.com/office/drawing/2014/main" id="{A1C323F6-4B85-E04C-A91F-372DE0B1AFFE}"/>
               </a:ext>
             </a:extLst>
           </p:cNvPr>
@@ -12652,7 +12710,7 @@
         </p:blipFill>
         <p:spPr>
           <a:xfrm>
-            <a:off x="7353495" y="1991668"/>
+            <a:off x="6132669" y="5209986"/>
             <a:ext cx="1267968" cy="693420"/>
           </a:xfrm>
           <a:prstGeom prst="rect">
@@ -12662,10 +12720,10 @@
       </p:pic>
       <p:pic>
         <p:nvPicPr>
-          <p:cNvPr id="26" name="Picture 25">
-            <a:extLst>
-              <a:ext uri="{FF2B5EF4-FFF2-40B4-BE49-F238E27FC236}">
-                <a16:creationId xmlns:a16="http://schemas.microsoft.com/office/drawing/2014/main" id="{94A576D9-0A7F-114D-8135-21F51B366125}"/>
+          <p:cNvPr id="24" name="Picture 23">
+            <a:extLst>
+              <a:ext uri="{FF2B5EF4-FFF2-40B4-BE49-F238E27FC236}">
+                <a16:creationId xmlns:a16="http://schemas.microsoft.com/office/drawing/2014/main" id="{4381691B-16F0-7D47-B670-77FF91CA1532}"/>
               </a:ext>
             </a:extLst>
           </p:cNvPr>
@@ -12676,13 +12734,47 @@
         </p:nvPicPr>
         <p:blipFill>
           <a:blip r:embed="rId8"/>
+          <a:srcRect/>
+          <a:stretch/>
+        </p:blipFill>
+        <p:spPr>
+          <a:xfrm>
+            <a:off x="7354594" y="4617527"/>
+            <a:ext cx="1267968" cy="691895"/>
+          </a:xfrm>
+          <a:prstGeom prst="rect">
+            <a:avLst/>
+          </a:prstGeom>
+          <a:ln>
+            <a:solidFill>
+              <a:schemeClr val="tx1"/>
+            </a:solidFill>
+          </a:ln>
+        </p:spPr>
+      </p:pic>
+      <p:pic>
+        <p:nvPicPr>
+          <p:cNvPr id="26" name="Picture 25">
+            <a:extLst>
+              <a:ext uri="{FF2B5EF4-FFF2-40B4-BE49-F238E27FC236}">
+                <a16:creationId xmlns:a16="http://schemas.microsoft.com/office/drawing/2014/main" id="{94A576D9-0A7F-114D-8135-21F51B366125}"/>
+              </a:ext>
+            </a:extLst>
+          </p:cNvPr>
+          <p:cNvPicPr>
+            <a:picLocks noChangeAspect="1"/>
+          </p:cNvPicPr>
+          <p:nvPr/>
+        </p:nvPicPr>
+        <p:blipFill>
+          <a:blip r:embed="rId9"/>
           <a:stretch>
             <a:fillRect/>
           </a:stretch>
         </p:blipFill>
         <p:spPr>
           <a:xfrm>
-            <a:off x="8576520" y="5226028"/>
+            <a:off x="8576520" y="5324604"/>
             <a:ext cx="1267968" cy="693420"/>
           </a:xfrm>
           <a:prstGeom prst="rect">
@@ -15326,7 +15418,7 @@
           </p:blipFill>
           <p:spPr>
             <a:xfrm>
-              <a:off x="2277767" y="3437090"/>
+              <a:off x="2269675" y="3428998"/>
               <a:ext cx="721360" cy="450087"/>
             </a:xfrm>
             <a:prstGeom prst="rect">
@@ -15360,8 +15452,8 @@
           </p:blipFill>
           <p:spPr>
             <a:xfrm>
-              <a:off x="2961413" y="2946041"/>
-              <a:ext cx="721360" cy="450087"/>
+              <a:off x="2993781" y="2897997"/>
+              <a:ext cx="721360" cy="449071"/>
             </a:xfrm>
             <a:prstGeom prst="rect">
               <a:avLst/>
@@ -15394,7 +15486,7 @@
           </p:blipFill>
           <p:spPr>
             <a:xfrm>
-              <a:off x="3749909" y="3876319"/>
+              <a:off x="3733725" y="3892503"/>
               <a:ext cx="721360" cy="450087"/>
             </a:xfrm>
             <a:prstGeom prst="rect">
@@ -15428,7 +15520,7 @@
           </p:blipFill>
           <p:spPr>
             <a:xfrm>
-              <a:off x="4511965" y="5768652"/>
+              <a:off x="4495781" y="5687732"/>
               <a:ext cx="721360" cy="450087"/>
             </a:xfrm>
             <a:prstGeom prst="rect">
@@ -15462,7 +15554,7 @@
           </p:blipFill>
           <p:spPr>
             <a:xfrm>
-              <a:off x="5232551" y="5231004"/>
+              <a:off x="5200183" y="5166268"/>
               <a:ext cx="721360" cy="450087"/>
             </a:xfrm>
             <a:prstGeom prst="rect">
@@ -15496,8 +15588,8 @@
           </p:blipFill>
           <p:spPr>
             <a:xfrm>
-              <a:off x="5941116" y="2893069"/>
-              <a:ext cx="721360" cy="450087"/>
+              <a:off x="5921543" y="2893577"/>
+              <a:ext cx="721360" cy="449071"/>
             </a:xfrm>
             <a:prstGeom prst="rect">
               <a:avLst/>
@@ -15564,8 +15656,8 @@
           </p:blipFill>
           <p:spPr>
             <a:xfrm>
-              <a:off x="7441238" y="2503454"/>
-              <a:ext cx="721360" cy="450087"/>
+              <a:off x="7441238" y="2503962"/>
+              <a:ext cx="721360" cy="449071"/>
             </a:xfrm>
             <a:prstGeom prst="rect">
               <a:avLst/>
@@ -15700,8 +15792,8 @@
           </p:blipFill>
           <p:spPr>
             <a:xfrm>
-              <a:off x="6623847" y="588146"/>
-              <a:ext cx="721360" cy="450087"/>
+              <a:off x="6623847" y="588654"/>
+              <a:ext cx="721360" cy="449071"/>
             </a:xfrm>
             <a:prstGeom prst="rect">
               <a:avLst/>
@@ -15768,8 +15860,8 @@
           </p:blipFill>
           <p:spPr>
             <a:xfrm>
-              <a:off x="5953911" y="4691651"/>
-              <a:ext cx="721360" cy="450087"/>
+              <a:off x="5921543" y="4643607"/>
+              <a:ext cx="721360" cy="449071"/>
             </a:xfrm>
             <a:prstGeom prst="rect">
               <a:avLst/>

</xml_diff>